<commit_message>
Small changes on GROUP BY slides
</commit_message>
<xml_diff>
--- a/Courses/Software-Sciences/Module-3-Databases-New/11-Group-and-Aggregate-Functions/11-Group-and-Aggregate-Functions.pptx
+++ b/Courses/Software-Sciences/Module-3-Databases-New/11-Group-and-Aggregate-Functions/11-Group-and-Aggregate-Functions.pptx
@@ -465,7 +465,7 @@
           <a:p>
             <a:fld id="{4E087215-0C8F-4762-A664-737A353EC9A4}" type="datetimeFigureOut">
               <a:rPr lang="bg-BG" smtClean="0"/>
-              <a:t>18.12.2023 г.</a:t>
+              <a:t>15.4.2024 г.</a:t>
             </a:fld>
             <a:endParaRPr lang="bg-BG"/>
           </a:p>
@@ -661,7 +661,7 @@
           <a:p>
             <a:fld id="{72D84649-876A-46C9-8472-14CB09C070D8}" type="datetimeFigureOut">
               <a:rPr lang="en-US" smtClean="0"/>
-              <a:t>12/18/2023</a:t>
+              <a:t>4/15/2024</a:t>
             </a:fld>
             <a:endParaRPr lang="en-US"/>
           </a:p>
@@ -33814,12 +33814,23 @@
               <a:t> </a:t>
             </a:r>
             <a:r>
+              <a:rPr lang="bg-BG" sz="2600" b="1" dirty="0">
+                <a:solidFill>
+                  <a:schemeClr val="bg1">
+                    <a:lumMod val="60000"/>
+                    <a:lumOff val="40000"/>
+                  </a:schemeClr>
+                </a:solidFill>
+              </a:rPr>
+              <a:t>брой</a:t>
+            </a:r>
+            <a:r>
               <a:rPr lang="bg-BG" sz="2600" dirty="0">
                 <a:solidFill>
                   <a:schemeClr val="bg2"/>
                 </a:solidFill>
               </a:rPr>
-              <a:t>брой на избраните редове</a:t>
+              <a:t> на избраните редове</a:t>
             </a:r>
             <a:endParaRPr lang="en-US" sz="2600" dirty="0">
               <a:solidFill>
@@ -33859,12 +33870,23 @@
               <a:t>== </a:t>
             </a:r>
             <a:r>
+              <a:rPr lang="ru-RU" sz="2600" b="1" dirty="0">
+                <a:solidFill>
+                  <a:schemeClr val="bg1">
+                    <a:lumMod val="60000"/>
+                    <a:lumOff val="40000"/>
+                  </a:schemeClr>
+                </a:solidFill>
+              </a:rPr>
+              <a:t>сбор</a:t>
+            </a:r>
+            <a:r>
               <a:rPr lang="ru-RU" sz="2600" dirty="0">
                 <a:solidFill>
                   <a:schemeClr val="bg2"/>
                 </a:solidFill>
               </a:rPr>
-              <a:t>сбор от стойностите в дадена колона</a:t>
+              <a:t> от стойностите в дадена колона</a:t>
             </a:r>
             <a:endParaRPr lang="en-US" sz="2600" dirty="0">
               <a:solidFill>
@@ -33904,12 +33926,23 @@
               <a:t>== </a:t>
             </a:r>
             <a:r>
+              <a:rPr lang="ru-RU" sz="2600" b="1" dirty="0">
+                <a:solidFill>
+                  <a:schemeClr val="bg1">
+                    <a:lumMod val="60000"/>
+                    <a:lumOff val="40000"/>
+                  </a:schemeClr>
+                </a:solidFill>
+              </a:rPr>
+              <a:t>минималната</a:t>
+            </a:r>
+            <a:r>
               <a:rPr lang="ru-RU" sz="2600" dirty="0">
                 <a:solidFill>
                   <a:schemeClr val="bg2"/>
                 </a:solidFill>
               </a:rPr>
-              <a:t>минималната стойност в дадена колона</a:t>
+              <a:t> стойност в дадена колона</a:t>
             </a:r>
             <a:endParaRPr lang="en-US" sz="2600" dirty="0">
               <a:solidFill>
@@ -33949,12 +33982,23 @@
               <a:t>== </a:t>
             </a:r>
             <a:r>
+              <a:rPr lang="ru-RU" sz="2600" b="1" dirty="0">
+                <a:solidFill>
+                  <a:schemeClr val="bg1">
+                    <a:lumMod val="60000"/>
+                    <a:lumOff val="40000"/>
+                  </a:schemeClr>
+                </a:solidFill>
+              </a:rPr>
+              <a:t>максималната</a:t>
+            </a:r>
+            <a:r>
               <a:rPr lang="ru-RU" sz="2600" dirty="0">
                 <a:solidFill>
                   <a:schemeClr val="bg2"/>
                 </a:solidFill>
               </a:rPr>
-              <a:t>максималната стойност в дадена колона</a:t>
+              <a:t> стойност в дадена колона</a:t>
             </a:r>
             <a:endParaRPr lang="en-US" sz="2600" b="1" dirty="0">
               <a:solidFill>
@@ -33997,12 +34041,23 @@
               <a:t> == </a:t>
             </a:r>
             <a:r>
+              <a:rPr lang="ru-RU" sz="2600" b="1" dirty="0">
+                <a:solidFill>
+                  <a:schemeClr val="bg1">
+                    <a:lumMod val="60000"/>
+                    <a:lumOff val="40000"/>
+                  </a:schemeClr>
+                </a:solidFill>
+              </a:rPr>
+              <a:t>средноаритметична</a:t>
+            </a:r>
+            <a:r>
               <a:rPr lang="ru-RU" sz="2600" dirty="0">
                 <a:solidFill>
                   <a:schemeClr val="bg2"/>
                 </a:solidFill>
               </a:rPr>
-              <a:t>средноаритметична стойност в дадена колона</a:t>
+              <a:t> стойност в дадена колона</a:t>
             </a:r>
             <a:endParaRPr lang="en-US" sz="2600" dirty="0">
               <a:solidFill>

</xml_diff>